<commit_message>
DeveloperGuide: remove child Command classes in class diagram
</commit_message>
<xml_diff>
--- a/doc/Diagrams.pptx
+++ b/doc/Diagrams.pptx
@@ -126,6 +126,10 @@
 </p:presentation>
 </file>
 
+<file path=ppt/revisionInfo.xml><?xml version="1.0" encoding="utf-8"?>
+<p1510:revInfo xmlns:a="http://schemas.openxmlformats.org/drawingml/2006/main" xmlns:r="http://schemas.openxmlformats.org/officeDocument/2006/relationships" xmlns:p1510="http://schemas.microsoft.com/office/powerpoint/2015/10/main"/>
+</file>
+
 <file path=ppt/slideLayouts/slideLayout1.xml><?xml version="1.0" encoding="utf-8"?>
 <p:sldLayout xmlns:a="http://schemas.openxmlformats.org/drawingml/2006/main" xmlns:r="http://schemas.openxmlformats.org/officeDocument/2006/relationships" xmlns:p="http://schemas.openxmlformats.org/presentationml/2006/main" type="title" preserve="1">
   <p:cSld name="Title Slide">
@@ -164,10 +168,9 @@
           <a:lstStyle/>
           <a:p>
             <a:r>
-              <a:rPr lang="en-US" smtClean="0"/>
+              <a:rPr lang="en-US"/>
               <a:t>Click to edit Master title style</a:t>
             </a:r>
-            <a:endParaRPr lang="en-US"/>
           </a:p>
         </p:txBody>
       </p:sp>
@@ -283,10 +286,9 @@
           </a:lstStyle>
           <a:p>
             <a:r>
-              <a:rPr lang="en-US" smtClean="0"/>
+              <a:rPr lang="en-US"/>
               <a:t>Click to edit Master subtitle style</a:t>
             </a:r>
-            <a:endParaRPr lang="en-US"/>
           </a:p>
         </p:txBody>
       </p:sp>
@@ -307,7 +309,7 @@
           <a:p>
             <a:fld id="{78C97017-6FC3-485B-9764-EAC9E56C1D49}" type="datetimeFigureOut">
               <a:rPr lang="en-US" smtClean="0"/>
-              <a:t>8/31/2017</a:t>
+              <a:t>1/27/2018</a:t>
             </a:fld>
             <a:endParaRPr lang="en-US"/>
           </a:p>
@@ -401,10 +403,9 @@
           <a:lstStyle/>
           <a:p>
             <a:r>
-              <a:rPr lang="en-US" smtClean="0"/>
+              <a:rPr lang="en-US"/>
               <a:t>Click to edit Master title style</a:t>
             </a:r>
-            <a:endParaRPr lang="en-US"/>
           </a:p>
         </p:txBody>
       </p:sp>
@@ -425,38 +426,37 @@
           <a:p>
             <a:pPr lvl="0"/>
             <a:r>
-              <a:rPr lang="en-US" smtClean="0"/>
+              <a:rPr lang="en-US"/>
               <a:t>Click to edit Master text styles</a:t>
             </a:r>
           </a:p>
           <a:p>
             <a:pPr lvl="1"/>
             <a:r>
-              <a:rPr lang="en-US" smtClean="0"/>
+              <a:rPr lang="en-US"/>
               <a:t>Second level</a:t>
             </a:r>
           </a:p>
           <a:p>
             <a:pPr lvl="2"/>
             <a:r>
-              <a:rPr lang="en-US" smtClean="0"/>
+              <a:rPr lang="en-US"/>
               <a:t>Third level</a:t>
             </a:r>
           </a:p>
           <a:p>
             <a:pPr lvl="3"/>
             <a:r>
-              <a:rPr lang="en-US" smtClean="0"/>
+              <a:rPr lang="en-US"/>
               <a:t>Fourth level</a:t>
             </a:r>
           </a:p>
           <a:p>
             <a:pPr lvl="4"/>
             <a:r>
-              <a:rPr lang="en-US" smtClean="0"/>
+              <a:rPr lang="en-US"/>
               <a:t>Fifth level</a:t>
             </a:r>
-            <a:endParaRPr lang="en-US"/>
           </a:p>
         </p:txBody>
       </p:sp>
@@ -477,7 +477,7 @@
           <a:p>
             <a:fld id="{78C97017-6FC3-485B-9764-EAC9E56C1D49}" type="datetimeFigureOut">
               <a:rPr lang="en-US" smtClean="0"/>
-              <a:t>8/31/2017</a:t>
+              <a:t>1/27/2018</a:t>
             </a:fld>
             <a:endParaRPr lang="en-US"/>
           </a:p>
@@ -576,10 +576,9 @@
           <a:lstStyle/>
           <a:p>
             <a:r>
-              <a:rPr lang="en-US" smtClean="0"/>
+              <a:rPr lang="en-US"/>
               <a:t>Click to edit Master title style</a:t>
             </a:r>
-            <a:endParaRPr lang="en-US"/>
           </a:p>
         </p:txBody>
       </p:sp>
@@ -605,38 +604,37 @@
           <a:p>
             <a:pPr lvl="0"/>
             <a:r>
-              <a:rPr lang="en-US" smtClean="0"/>
+              <a:rPr lang="en-US"/>
               <a:t>Click to edit Master text styles</a:t>
             </a:r>
           </a:p>
           <a:p>
             <a:pPr lvl="1"/>
             <a:r>
-              <a:rPr lang="en-US" smtClean="0"/>
+              <a:rPr lang="en-US"/>
               <a:t>Second level</a:t>
             </a:r>
           </a:p>
           <a:p>
             <a:pPr lvl="2"/>
             <a:r>
-              <a:rPr lang="en-US" smtClean="0"/>
+              <a:rPr lang="en-US"/>
               <a:t>Third level</a:t>
             </a:r>
           </a:p>
           <a:p>
             <a:pPr lvl="3"/>
             <a:r>
-              <a:rPr lang="en-US" smtClean="0"/>
+              <a:rPr lang="en-US"/>
               <a:t>Fourth level</a:t>
             </a:r>
           </a:p>
           <a:p>
             <a:pPr lvl="4"/>
             <a:r>
-              <a:rPr lang="en-US" smtClean="0"/>
+              <a:rPr lang="en-US"/>
               <a:t>Fifth level</a:t>
             </a:r>
-            <a:endParaRPr lang="en-US"/>
           </a:p>
         </p:txBody>
       </p:sp>
@@ -657,7 +655,7 @@
           <a:p>
             <a:fld id="{78C97017-6FC3-485B-9764-EAC9E56C1D49}" type="datetimeFigureOut">
               <a:rPr lang="en-US" smtClean="0"/>
-              <a:t>8/31/2017</a:t>
+              <a:t>1/27/2018</a:t>
             </a:fld>
             <a:endParaRPr lang="en-US"/>
           </a:p>
@@ -751,10 +749,9 @@
           <a:lstStyle/>
           <a:p>
             <a:r>
-              <a:rPr lang="en-US" smtClean="0"/>
+              <a:rPr lang="en-US"/>
               <a:t>Click to edit Master title style</a:t>
             </a:r>
-            <a:endParaRPr lang="en-US"/>
           </a:p>
         </p:txBody>
       </p:sp>
@@ -775,38 +772,37 @@
           <a:p>
             <a:pPr lvl="0"/>
             <a:r>
-              <a:rPr lang="en-US" smtClean="0"/>
+              <a:rPr lang="en-US"/>
               <a:t>Click to edit Master text styles</a:t>
             </a:r>
           </a:p>
           <a:p>
             <a:pPr lvl="1"/>
             <a:r>
-              <a:rPr lang="en-US" smtClean="0"/>
+              <a:rPr lang="en-US"/>
               <a:t>Second level</a:t>
             </a:r>
           </a:p>
           <a:p>
             <a:pPr lvl="2"/>
             <a:r>
-              <a:rPr lang="en-US" smtClean="0"/>
+              <a:rPr lang="en-US"/>
               <a:t>Third level</a:t>
             </a:r>
           </a:p>
           <a:p>
             <a:pPr lvl="3"/>
             <a:r>
-              <a:rPr lang="en-US" smtClean="0"/>
+              <a:rPr lang="en-US"/>
               <a:t>Fourth level</a:t>
             </a:r>
           </a:p>
           <a:p>
             <a:pPr lvl="4"/>
             <a:r>
-              <a:rPr lang="en-US" smtClean="0"/>
+              <a:rPr lang="en-US"/>
               <a:t>Fifth level</a:t>
             </a:r>
-            <a:endParaRPr lang="en-US"/>
           </a:p>
         </p:txBody>
       </p:sp>
@@ -827,7 +823,7 @@
           <a:p>
             <a:fld id="{78C97017-6FC3-485B-9764-EAC9E56C1D49}" type="datetimeFigureOut">
               <a:rPr lang="en-US" smtClean="0"/>
-              <a:t>8/31/2017</a:t>
+              <a:t>1/27/2018</a:t>
             </a:fld>
             <a:endParaRPr lang="en-US"/>
           </a:p>
@@ -930,10 +926,9 @@
           </a:lstStyle>
           <a:p>
             <a:r>
-              <a:rPr lang="en-US" smtClean="0"/>
+              <a:rPr lang="en-US"/>
               <a:t>Click to edit Master title style</a:t>
             </a:r>
-            <a:endParaRPr lang="en-US"/>
           </a:p>
         </p:txBody>
       </p:sp>
@@ -1050,7 +1045,7 @@
           <a:p>
             <a:pPr lvl="0"/>
             <a:r>
-              <a:rPr lang="en-US" smtClean="0"/>
+              <a:rPr lang="en-US"/>
               <a:t>Click to edit Master text styles</a:t>
             </a:r>
           </a:p>
@@ -1073,7 +1068,7 @@
           <a:p>
             <a:fld id="{78C97017-6FC3-485B-9764-EAC9E56C1D49}" type="datetimeFigureOut">
               <a:rPr lang="en-US" smtClean="0"/>
-              <a:t>8/31/2017</a:t>
+              <a:t>1/27/2018</a:t>
             </a:fld>
             <a:endParaRPr lang="en-US"/>
           </a:p>
@@ -1167,10 +1162,9 @@
           <a:lstStyle/>
           <a:p>
             <a:r>
-              <a:rPr lang="en-US" smtClean="0"/>
+              <a:rPr lang="en-US"/>
               <a:t>Click to edit Master title style</a:t>
             </a:r>
-            <a:endParaRPr lang="en-US"/>
           </a:p>
         </p:txBody>
       </p:sp>
@@ -1224,38 +1218,37 @@
           <a:p>
             <a:pPr lvl="0"/>
             <a:r>
-              <a:rPr lang="en-US" smtClean="0"/>
+              <a:rPr lang="en-US"/>
               <a:t>Click to edit Master text styles</a:t>
             </a:r>
           </a:p>
           <a:p>
             <a:pPr lvl="1"/>
             <a:r>
-              <a:rPr lang="en-US" smtClean="0"/>
+              <a:rPr lang="en-US"/>
               <a:t>Second level</a:t>
             </a:r>
           </a:p>
           <a:p>
             <a:pPr lvl="2"/>
             <a:r>
-              <a:rPr lang="en-US" smtClean="0"/>
+              <a:rPr lang="en-US"/>
               <a:t>Third level</a:t>
             </a:r>
           </a:p>
           <a:p>
             <a:pPr lvl="3"/>
             <a:r>
-              <a:rPr lang="en-US" smtClean="0"/>
+              <a:rPr lang="en-US"/>
               <a:t>Fourth level</a:t>
             </a:r>
           </a:p>
           <a:p>
             <a:pPr lvl="4"/>
             <a:r>
-              <a:rPr lang="en-US" smtClean="0"/>
+              <a:rPr lang="en-US"/>
               <a:t>Fifth level</a:t>
             </a:r>
-            <a:endParaRPr lang="en-US"/>
           </a:p>
         </p:txBody>
       </p:sp>
@@ -1309,38 +1302,37 @@
           <a:p>
             <a:pPr lvl="0"/>
             <a:r>
-              <a:rPr lang="en-US" smtClean="0"/>
+              <a:rPr lang="en-US"/>
               <a:t>Click to edit Master text styles</a:t>
             </a:r>
           </a:p>
           <a:p>
             <a:pPr lvl="1"/>
             <a:r>
-              <a:rPr lang="en-US" smtClean="0"/>
+              <a:rPr lang="en-US"/>
               <a:t>Second level</a:t>
             </a:r>
           </a:p>
           <a:p>
             <a:pPr lvl="2"/>
             <a:r>
-              <a:rPr lang="en-US" smtClean="0"/>
+              <a:rPr lang="en-US"/>
               <a:t>Third level</a:t>
             </a:r>
           </a:p>
           <a:p>
             <a:pPr lvl="3"/>
             <a:r>
-              <a:rPr lang="en-US" smtClean="0"/>
+              <a:rPr lang="en-US"/>
               <a:t>Fourth level</a:t>
             </a:r>
           </a:p>
           <a:p>
             <a:pPr lvl="4"/>
             <a:r>
-              <a:rPr lang="en-US" smtClean="0"/>
+              <a:rPr lang="en-US"/>
               <a:t>Fifth level</a:t>
             </a:r>
-            <a:endParaRPr lang="en-US"/>
           </a:p>
         </p:txBody>
       </p:sp>
@@ -1361,7 +1353,7 @@
           <a:p>
             <a:fld id="{78C97017-6FC3-485B-9764-EAC9E56C1D49}" type="datetimeFigureOut">
               <a:rPr lang="en-US" smtClean="0"/>
-              <a:t>8/31/2017</a:t>
+              <a:t>1/27/2018</a:t>
             </a:fld>
             <a:endParaRPr lang="en-US"/>
           </a:p>
@@ -1459,10 +1451,9 @@
           </a:lstStyle>
           <a:p>
             <a:r>
-              <a:rPr lang="en-US" smtClean="0"/>
+              <a:rPr lang="en-US"/>
               <a:t>Click to edit Master title style</a:t>
             </a:r>
-            <a:endParaRPr lang="en-US"/>
           </a:p>
         </p:txBody>
       </p:sp>
@@ -1525,7 +1516,7 @@
           <a:p>
             <a:pPr lvl="0"/>
             <a:r>
-              <a:rPr lang="en-US" smtClean="0"/>
+              <a:rPr lang="en-US"/>
               <a:t>Click to edit Master text styles</a:t>
             </a:r>
           </a:p>
@@ -1581,38 +1572,37 @@
           <a:p>
             <a:pPr lvl="0"/>
             <a:r>
-              <a:rPr lang="en-US" smtClean="0"/>
+              <a:rPr lang="en-US"/>
               <a:t>Click to edit Master text styles</a:t>
             </a:r>
           </a:p>
           <a:p>
             <a:pPr lvl="1"/>
             <a:r>
-              <a:rPr lang="en-US" smtClean="0"/>
+              <a:rPr lang="en-US"/>
               <a:t>Second level</a:t>
             </a:r>
           </a:p>
           <a:p>
             <a:pPr lvl="2"/>
             <a:r>
-              <a:rPr lang="en-US" smtClean="0"/>
+              <a:rPr lang="en-US"/>
               <a:t>Third level</a:t>
             </a:r>
           </a:p>
           <a:p>
             <a:pPr lvl="3"/>
             <a:r>
-              <a:rPr lang="en-US" smtClean="0"/>
+              <a:rPr lang="en-US"/>
               <a:t>Fourth level</a:t>
             </a:r>
           </a:p>
           <a:p>
             <a:pPr lvl="4"/>
             <a:r>
-              <a:rPr lang="en-US" smtClean="0"/>
+              <a:rPr lang="en-US"/>
               <a:t>Fifth level</a:t>
             </a:r>
-            <a:endParaRPr lang="en-US"/>
           </a:p>
         </p:txBody>
       </p:sp>
@@ -1675,7 +1665,7 @@
           <a:p>
             <a:pPr lvl="0"/>
             <a:r>
-              <a:rPr lang="en-US" smtClean="0"/>
+              <a:rPr lang="en-US"/>
               <a:t>Click to edit Master text styles</a:t>
             </a:r>
           </a:p>
@@ -1731,38 +1721,37 @@
           <a:p>
             <a:pPr lvl="0"/>
             <a:r>
-              <a:rPr lang="en-US" smtClean="0"/>
+              <a:rPr lang="en-US"/>
               <a:t>Click to edit Master text styles</a:t>
             </a:r>
           </a:p>
           <a:p>
             <a:pPr lvl="1"/>
             <a:r>
-              <a:rPr lang="en-US" smtClean="0"/>
+              <a:rPr lang="en-US"/>
               <a:t>Second level</a:t>
             </a:r>
           </a:p>
           <a:p>
             <a:pPr lvl="2"/>
             <a:r>
-              <a:rPr lang="en-US" smtClean="0"/>
+              <a:rPr lang="en-US"/>
               <a:t>Third level</a:t>
             </a:r>
           </a:p>
           <a:p>
             <a:pPr lvl="3"/>
             <a:r>
-              <a:rPr lang="en-US" smtClean="0"/>
+              <a:rPr lang="en-US"/>
               <a:t>Fourth level</a:t>
             </a:r>
           </a:p>
           <a:p>
             <a:pPr lvl="4"/>
             <a:r>
-              <a:rPr lang="en-US" smtClean="0"/>
+              <a:rPr lang="en-US"/>
               <a:t>Fifth level</a:t>
             </a:r>
-            <a:endParaRPr lang="en-US"/>
           </a:p>
         </p:txBody>
       </p:sp>
@@ -1783,7 +1772,7 @@
           <a:p>
             <a:fld id="{78C97017-6FC3-485B-9764-EAC9E56C1D49}" type="datetimeFigureOut">
               <a:rPr lang="en-US" smtClean="0"/>
-              <a:t>8/31/2017</a:t>
+              <a:t>1/27/2018</a:t>
             </a:fld>
             <a:endParaRPr lang="en-US"/>
           </a:p>
@@ -1877,10 +1866,9 @@
           <a:lstStyle/>
           <a:p>
             <a:r>
-              <a:rPr lang="en-US" smtClean="0"/>
+              <a:rPr lang="en-US"/>
               <a:t>Click to edit Master title style</a:t>
             </a:r>
-            <a:endParaRPr lang="en-US"/>
           </a:p>
         </p:txBody>
       </p:sp>
@@ -1901,7 +1889,7 @@
           <a:p>
             <a:fld id="{78C97017-6FC3-485B-9764-EAC9E56C1D49}" type="datetimeFigureOut">
               <a:rPr lang="en-US" smtClean="0"/>
-              <a:t>8/31/2017</a:t>
+              <a:t>1/27/2018</a:t>
             </a:fld>
             <a:endParaRPr lang="en-US"/>
           </a:p>
@@ -1996,7 +1984,7 @@
           <a:p>
             <a:fld id="{78C97017-6FC3-485B-9764-EAC9E56C1D49}" type="datetimeFigureOut">
               <a:rPr lang="en-US" smtClean="0"/>
-              <a:t>8/31/2017</a:t>
+              <a:t>1/27/2018</a:t>
             </a:fld>
             <a:endParaRPr lang="en-US"/>
           </a:p>
@@ -2099,10 +2087,9 @@
           </a:lstStyle>
           <a:p>
             <a:r>
-              <a:rPr lang="en-US" smtClean="0"/>
+              <a:rPr lang="en-US"/>
               <a:t>Click to edit Master title style</a:t>
             </a:r>
-            <a:endParaRPr lang="en-US"/>
           </a:p>
         </p:txBody>
       </p:sp>
@@ -2156,38 +2143,37 @@
           <a:p>
             <a:pPr lvl="0"/>
             <a:r>
-              <a:rPr lang="en-US" smtClean="0"/>
+              <a:rPr lang="en-US"/>
               <a:t>Click to edit Master text styles</a:t>
             </a:r>
           </a:p>
           <a:p>
             <a:pPr lvl="1"/>
             <a:r>
-              <a:rPr lang="en-US" smtClean="0"/>
+              <a:rPr lang="en-US"/>
               <a:t>Second level</a:t>
             </a:r>
           </a:p>
           <a:p>
             <a:pPr lvl="2"/>
             <a:r>
-              <a:rPr lang="en-US" smtClean="0"/>
+              <a:rPr lang="en-US"/>
               <a:t>Third level</a:t>
             </a:r>
           </a:p>
           <a:p>
             <a:pPr lvl="3"/>
             <a:r>
-              <a:rPr lang="en-US" smtClean="0"/>
+              <a:rPr lang="en-US"/>
               <a:t>Fourth level</a:t>
             </a:r>
           </a:p>
           <a:p>
             <a:pPr lvl="4"/>
             <a:r>
-              <a:rPr lang="en-US" smtClean="0"/>
+              <a:rPr lang="en-US"/>
               <a:t>Fifth level</a:t>
             </a:r>
-            <a:endParaRPr lang="en-US"/>
           </a:p>
         </p:txBody>
       </p:sp>
@@ -2250,7 +2236,7 @@
           <a:p>
             <a:pPr lvl="0"/>
             <a:r>
-              <a:rPr lang="en-US" smtClean="0"/>
+              <a:rPr lang="en-US"/>
               <a:t>Click to edit Master text styles</a:t>
             </a:r>
           </a:p>
@@ -2273,7 +2259,7 @@
           <a:p>
             <a:fld id="{78C97017-6FC3-485B-9764-EAC9E56C1D49}" type="datetimeFigureOut">
               <a:rPr lang="en-US" smtClean="0"/>
-              <a:t>8/31/2017</a:t>
+              <a:t>1/27/2018</a:t>
             </a:fld>
             <a:endParaRPr lang="en-US"/>
           </a:p>
@@ -2376,10 +2362,9 @@
           </a:lstStyle>
           <a:p>
             <a:r>
-              <a:rPr lang="en-US" smtClean="0"/>
+              <a:rPr lang="en-US"/>
               <a:t>Click to edit Master title style</a:t>
             </a:r>
-            <a:endParaRPr lang="en-US"/>
           </a:p>
         </p:txBody>
       </p:sp>
@@ -2503,7 +2488,7 @@
           <a:p>
             <a:pPr lvl="0"/>
             <a:r>
-              <a:rPr lang="en-US" smtClean="0"/>
+              <a:rPr lang="en-US"/>
               <a:t>Click to edit Master text styles</a:t>
             </a:r>
           </a:p>
@@ -2526,7 +2511,7 @@
           <a:p>
             <a:fld id="{78C97017-6FC3-485B-9764-EAC9E56C1D49}" type="datetimeFigureOut">
               <a:rPr lang="en-US" smtClean="0"/>
-              <a:t>8/31/2017</a:t>
+              <a:t>1/27/2018</a:t>
             </a:fld>
             <a:endParaRPr lang="en-US"/>
           </a:p>
@@ -2635,10 +2620,9 @@
           <a:lstStyle/>
           <a:p>
             <a:r>
-              <a:rPr lang="en-US" smtClean="0"/>
+              <a:rPr lang="en-US"/>
               <a:t>Click to edit Master title style</a:t>
             </a:r>
-            <a:endParaRPr lang="en-US"/>
           </a:p>
         </p:txBody>
       </p:sp>
@@ -2669,38 +2653,37 @@
           <a:p>
             <a:pPr lvl="0"/>
             <a:r>
-              <a:rPr lang="en-US" smtClean="0"/>
+              <a:rPr lang="en-US"/>
               <a:t>Click to edit Master text styles</a:t>
             </a:r>
           </a:p>
           <a:p>
             <a:pPr lvl="1"/>
             <a:r>
-              <a:rPr lang="en-US" smtClean="0"/>
+              <a:rPr lang="en-US"/>
               <a:t>Second level</a:t>
             </a:r>
           </a:p>
           <a:p>
             <a:pPr lvl="2"/>
             <a:r>
-              <a:rPr lang="en-US" smtClean="0"/>
+              <a:rPr lang="en-US"/>
               <a:t>Third level</a:t>
             </a:r>
           </a:p>
           <a:p>
             <a:pPr lvl="3"/>
             <a:r>
-              <a:rPr lang="en-US" smtClean="0"/>
+              <a:rPr lang="en-US"/>
               <a:t>Fourth level</a:t>
             </a:r>
           </a:p>
           <a:p>
             <a:pPr lvl="4"/>
             <a:r>
-              <a:rPr lang="en-US" smtClean="0"/>
+              <a:rPr lang="en-US"/>
               <a:t>Fifth level</a:t>
             </a:r>
-            <a:endParaRPr lang="en-US"/>
           </a:p>
         </p:txBody>
       </p:sp>
@@ -2739,7 +2722,7 @@
           <a:p>
             <a:fld id="{78C97017-6FC3-485B-9764-EAC9E56C1D49}" type="datetimeFigureOut">
               <a:rPr lang="en-US" smtClean="0"/>
-              <a:t>8/31/2017</a:t>
+              <a:t>1/27/2018</a:t>
             </a:fld>
             <a:endParaRPr lang="en-US"/>
           </a:p>
@@ -3130,14 +3113,13 @@
           <a:lstStyle/>
           <a:p>
             <a:r>
-              <a:rPr lang="en-US" dirty="0" err="1" smtClean="0"/>
+              <a:rPr lang="en-US" dirty="0" err="1"/>
               <a:t>AddressBook</a:t>
             </a:r>
             <a:r>
-              <a:rPr lang="en-US" dirty="0" smtClean="0"/>
+              <a:rPr lang="en-US" dirty="0"/>
               <a:t> – Level 2</a:t>
             </a:r>
-            <a:endParaRPr lang="en-US" dirty="0"/>
           </a:p>
         </p:txBody>
       </p:sp>
@@ -3157,10 +3139,9 @@
           <a:lstStyle/>
           <a:p>
             <a:r>
-              <a:rPr lang="en-US" dirty="0" smtClean="0"/>
+              <a:rPr lang="en-US" dirty="0"/>
               <a:t>Diagrams</a:t>
             </a:r>
-            <a:endParaRPr lang="en-US" dirty="0"/>
           </a:p>
         </p:txBody>
       </p:sp>
@@ -3231,7 +3212,7 @@
           <a:p>
             <a:pPr algn="ctr"/>
             <a:r>
-              <a:rPr lang="en-US" sz="1050" dirty="0" err="1" smtClean="0"/>
+              <a:rPr lang="en-US" sz="1050" dirty="0" err="1"/>
               <a:t>TextUi</a:t>
             </a:r>
             <a:endParaRPr lang="en-SG" sz="1050" dirty="0"/>
@@ -3282,7 +3263,7 @@
           <a:p>
             <a:pPr algn="ctr"/>
             <a:r>
-              <a:rPr lang="en-US" sz="1050" dirty="0" smtClean="0">
+              <a:rPr lang="en-US" sz="1050" dirty="0">
                 <a:solidFill>
                   <a:schemeClr val="bg1"/>
                 </a:solidFill>
@@ -3378,7 +3359,7 @@
           <a:p>
             <a:pPr algn="ctr"/>
             <a:r>
-              <a:rPr lang="en-US" sz="1050" dirty="0" smtClean="0"/>
+              <a:rPr lang="en-US" sz="1050" dirty="0"/>
               <a:t>Parser</a:t>
             </a:r>
             <a:endParaRPr lang="en-SG" sz="1050" dirty="0"/>
@@ -3422,14 +3403,14 @@
           <a:p>
             <a:pPr algn="ctr"/>
             <a:r>
-              <a:rPr lang="en-US" sz="1050" dirty="0" smtClean="0"/>
+              <a:rPr lang="en-US" sz="1050" dirty="0"/>
               <a:t>Unique</a:t>
             </a:r>
             <a:br>
-              <a:rPr lang="en-US" sz="1050" dirty="0" smtClean="0"/>
+              <a:rPr lang="en-US" sz="1050" dirty="0"/>
             </a:br>
             <a:r>
-              <a:rPr lang="en-US" sz="1050" dirty="0" err="1" smtClean="0"/>
+              <a:rPr lang="en-US" sz="1050" dirty="0" err="1"/>
               <a:t>TagList</a:t>
             </a:r>
             <a:endParaRPr lang="en-SG" sz="1050" dirty="0"/>
@@ -3473,14 +3454,14 @@
           <a:p>
             <a:pPr algn="ctr"/>
             <a:r>
-              <a:rPr lang="en-US" sz="1050" dirty="0" smtClean="0"/>
+              <a:rPr lang="en-US" sz="1050" dirty="0"/>
               <a:t>Unique</a:t>
             </a:r>
             <a:br>
-              <a:rPr lang="en-US" sz="1050" dirty="0" smtClean="0"/>
+              <a:rPr lang="en-US" sz="1050" dirty="0"/>
             </a:br>
             <a:r>
-              <a:rPr lang="en-US" sz="1050" dirty="0" err="1" smtClean="0"/>
+              <a:rPr lang="en-US" sz="1050" dirty="0" err="1"/>
               <a:t>PersonList</a:t>
             </a:r>
             <a:endParaRPr lang="en-SG" sz="1050" dirty="0"/>
@@ -3524,7 +3505,7 @@
           <a:p>
             <a:pPr algn="ctr"/>
             <a:r>
-              <a:rPr lang="en-US" sz="1050" dirty="0" smtClean="0"/>
+              <a:rPr lang="en-US" sz="1050" dirty="0"/>
               <a:t>Person</a:t>
             </a:r>
             <a:endParaRPr lang="en-SG" sz="1050" dirty="0"/>
@@ -3568,7 +3549,7 @@
           <a:p>
             <a:pPr algn="ctr"/>
             <a:r>
-              <a:rPr lang="en-US" sz="1050" dirty="0" smtClean="0"/>
+              <a:rPr lang="en-US" sz="1050" dirty="0"/>
               <a:t>Phone</a:t>
             </a:r>
             <a:endParaRPr lang="en-SG" sz="1050" dirty="0"/>
@@ -3612,7 +3593,7 @@
           <a:p>
             <a:pPr algn="ctr"/>
             <a:r>
-              <a:rPr lang="en-US" sz="1050" dirty="0" smtClean="0"/>
+              <a:rPr lang="en-US" sz="1050" dirty="0"/>
               <a:t>Email</a:t>
             </a:r>
             <a:endParaRPr lang="en-SG" sz="1050" dirty="0"/>
@@ -3656,7 +3637,7 @@
           <a:p>
             <a:pPr algn="ctr"/>
             <a:r>
-              <a:rPr lang="en-US" sz="1050" dirty="0" smtClean="0"/>
+              <a:rPr lang="en-US" sz="1050" dirty="0"/>
               <a:t>Address</a:t>
             </a:r>
             <a:endParaRPr lang="en-SG" sz="1050" dirty="0"/>
@@ -3700,7 +3681,7 @@
           <a:p>
             <a:pPr algn="ctr"/>
             <a:r>
-              <a:rPr lang="en-US" sz="1050" dirty="0" err="1" smtClean="0"/>
+              <a:rPr lang="en-US" sz="1050" dirty="0" err="1"/>
               <a:t>StorageFile</a:t>
             </a:r>
             <a:endParaRPr lang="en-SG" sz="1050" dirty="0"/>
@@ -4435,14 +4416,14 @@
           <a:p>
             <a:pPr algn="ctr"/>
             <a:r>
-              <a:rPr lang="en-US" sz="1050" dirty="0" smtClean="0"/>
+              <a:rPr lang="en-US" sz="1050" dirty="0"/>
               <a:t>&lt;&lt;interface&gt;&gt;</a:t>
             </a:r>
           </a:p>
           <a:p>
             <a:pPr algn="ctr"/>
             <a:r>
-              <a:rPr lang="en-US" sz="1050" dirty="0" err="1" smtClean="0"/>
+              <a:rPr lang="en-US" sz="1050" dirty="0" err="1"/>
               <a:t>ReadOnlyPerson</a:t>
             </a:r>
             <a:endParaRPr lang="en-SG" sz="1050" dirty="0"/>
@@ -4609,381 +4590,13 @@
           <a:p>
             <a:pPr algn="ctr"/>
             <a:r>
-              <a:rPr lang="en-US" sz="1050" dirty="0" smtClean="0"/>
+              <a:rPr lang="en-US" sz="1050" dirty="0"/>
               <a:t>Command</a:t>
             </a:r>
             <a:endParaRPr lang="en-SG" sz="1050" dirty="0"/>
           </a:p>
         </p:txBody>
       </p:sp>
-      <p:sp>
-        <p:nvSpPr>
-          <p:cNvPr id="50" name="Rectangle 49"/>
-          <p:cNvSpPr/>
-          <p:nvPr/>
-        </p:nvSpPr>
-        <p:spPr>
-          <a:xfrm flipH="1">
-            <a:off x="4724400" y="1059080"/>
-            <a:ext cx="1404109" cy="346760"/>
-          </a:xfrm>
-          <a:prstGeom prst="rect">
-            <a:avLst/>
-          </a:prstGeom>
-          <a:ln w="19050"/>
-          <a:effectLst/>
-        </p:spPr>
-        <p:style>
-          <a:lnRef idx="1">
-            <a:schemeClr val="accent5"/>
-          </a:lnRef>
-          <a:fillRef idx="2">
-            <a:schemeClr val="accent5"/>
-          </a:fillRef>
-          <a:effectRef idx="1">
-            <a:schemeClr val="accent5"/>
-          </a:effectRef>
-          <a:fontRef idx="minor">
-            <a:schemeClr val="dk1"/>
-          </a:fontRef>
-        </p:style>
-        <p:txBody>
-          <a:bodyPr rtlCol="0" anchor="ctr"/>
-          <a:lstStyle/>
-          <a:p>
-            <a:pPr algn="ctr"/>
-            <a:r>
-              <a:rPr lang="en-US" sz="1050" dirty="0" err="1"/>
-              <a:t>AddCommand</a:t>
-            </a:r>
-            <a:endParaRPr lang="en-SG" sz="1050" dirty="0"/>
-          </a:p>
-        </p:txBody>
-      </p:sp>
-      <p:sp>
-        <p:nvSpPr>
-          <p:cNvPr id="52" name="Rectangle 51"/>
-          <p:cNvSpPr/>
-          <p:nvPr/>
-        </p:nvSpPr>
-        <p:spPr>
-          <a:xfrm flipH="1">
-            <a:off x="4724400" y="1454067"/>
-            <a:ext cx="1404109" cy="346760"/>
-          </a:xfrm>
-          <a:prstGeom prst="rect">
-            <a:avLst/>
-          </a:prstGeom>
-          <a:ln w="19050"/>
-          <a:effectLst/>
-        </p:spPr>
-        <p:style>
-          <a:lnRef idx="1">
-            <a:schemeClr val="accent5"/>
-          </a:lnRef>
-          <a:fillRef idx="2">
-            <a:schemeClr val="accent5"/>
-          </a:fillRef>
-          <a:effectRef idx="1">
-            <a:schemeClr val="accent5"/>
-          </a:effectRef>
-          <a:fontRef idx="minor">
-            <a:schemeClr val="dk1"/>
-          </a:fontRef>
-        </p:style>
-        <p:txBody>
-          <a:bodyPr rtlCol="0" anchor="ctr"/>
-          <a:lstStyle/>
-          <a:p>
-            <a:pPr algn="ctr"/>
-            <a:r>
-              <a:rPr lang="en-US" sz="1050" dirty="0" err="1"/>
-              <a:t>CrearCommand</a:t>
-            </a:r>
-            <a:endParaRPr lang="en-SG" sz="1050" dirty="0"/>
-          </a:p>
-        </p:txBody>
-      </p:sp>
-      <p:sp>
-        <p:nvSpPr>
-          <p:cNvPr id="53" name="Rectangle 52"/>
-          <p:cNvSpPr/>
-          <p:nvPr/>
-        </p:nvSpPr>
-        <p:spPr>
-          <a:xfrm flipH="1">
-            <a:off x="4724400" y="1849054"/>
-            <a:ext cx="1404109" cy="346760"/>
-          </a:xfrm>
-          <a:prstGeom prst="rect">
-            <a:avLst/>
-          </a:prstGeom>
-          <a:ln w="19050"/>
-          <a:effectLst/>
-        </p:spPr>
-        <p:style>
-          <a:lnRef idx="1">
-            <a:schemeClr val="accent5"/>
-          </a:lnRef>
-          <a:fillRef idx="2">
-            <a:schemeClr val="accent5"/>
-          </a:fillRef>
-          <a:effectRef idx="1">
-            <a:schemeClr val="accent5"/>
-          </a:effectRef>
-          <a:fontRef idx="minor">
-            <a:schemeClr val="dk1"/>
-          </a:fontRef>
-        </p:style>
-        <p:txBody>
-          <a:bodyPr rtlCol="0" anchor="ctr"/>
-          <a:lstStyle/>
-          <a:p>
-            <a:pPr algn="ctr"/>
-            <a:r>
-              <a:rPr lang="en-US" sz="1050" dirty="0" err="1"/>
-              <a:t>IncorrectCommand</a:t>
-            </a:r>
-            <a:endParaRPr lang="en-SG" sz="1050" dirty="0"/>
-          </a:p>
-        </p:txBody>
-      </p:sp>
-      <p:sp>
-        <p:nvSpPr>
-          <p:cNvPr id="54" name="Isosceles Triangle 53"/>
-          <p:cNvSpPr/>
-          <p:nvPr/>
-        </p:nvSpPr>
-        <p:spPr>
-          <a:xfrm rot="16200000">
-            <a:off x="4131203" y="1571491"/>
-            <a:ext cx="270504" cy="175523"/>
-          </a:xfrm>
-          <a:prstGeom prst="triangle">
-            <a:avLst/>
-          </a:prstGeom>
-          <a:ln w="19050"/>
-          <a:effectLst/>
-        </p:spPr>
-        <p:style>
-          <a:lnRef idx="1">
-            <a:schemeClr val="accent5"/>
-          </a:lnRef>
-          <a:fillRef idx="2">
-            <a:schemeClr val="accent5"/>
-          </a:fillRef>
-          <a:effectRef idx="1">
-            <a:schemeClr val="accent5"/>
-          </a:effectRef>
-          <a:fontRef idx="minor">
-            <a:schemeClr val="dk1"/>
-          </a:fontRef>
-        </p:style>
-        <p:txBody>
-          <a:bodyPr rtlCol="0" anchor="ctr"/>
-          <a:lstStyle/>
-          <a:p>
-            <a:pPr algn="ctr"/>
-            <a:endParaRPr lang="en-SG" sz="1050"/>
-          </a:p>
-        </p:txBody>
-      </p:sp>
-      <p:cxnSp>
-        <p:nvCxnSpPr>
-          <p:cNvPr id="55" name="Elbow Connector 54"/>
-          <p:cNvCxnSpPr>
-            <a:stCxn id="54" idx="3"/>
-            <a:endCxn id="52" idx="3"/>
-          </p:cNvCxnSpPr>
-          <p:nvPr/>
-        </p:nvCxnSpPr>
-        <p:spPr>
-          <a:xfrm flipV="1">
-            <a:off x="4354217" y="1627447"/>
-            <a:ext cx="370183" cy="31806"/>
-          </a:xfrm>
-          <a:prstGeom prst="bentConnector3">
-            <a:avLst>
-              <a:gd name="adj1" fmla="val 50000"/>
-            </a:avLst>
-          </a:prstGeom>
-          <a:noFill/>
-          <a:ln w="19050"/>
-          <a:effectLst/>
-        </p:spPr>
-        <p:style>
-          <a:lnRef idx="1">
-            <a:schemeClr val="accent5"/>
-          </a:lnRef>
-          <a:fillRef idx="2">
-            <a:schemeClr val="accent5"/>
-          </a:fillRef>
-          <a:effectRef idx="1">
-            <a:schemeClr val="accent5"/>
-          </a:effectRef>
-          <a:fontRef idx="minor">
-            <a:schemeClr val="dk1"/>
-          </a:fontRef>
-        </p:style>
-      </p:cxnSp>
-      <p:cxnSp>
-        <p:nvCxnSpPr>
-          <p:cNvPr id="56" name="Elbow Connector 55"/>
-          <p:cNvCxnSpPr>
-            <a:stCxn id="54" idx="3"/>
-            <a:endCxn id="50" idx="3"/>
-          </p:cNvCxnSpPr>
-          <p:nvPr/>
-        </p:nvCxnSpPr>
-        <p:spPr>
-          <a:xfrm flipV="1">
-            <a:off x="4354217" y="1232460"/>
-            <a:ext cx="370183" cy="426793"/>
-          </a:xfrm>
-          <a:prstGeom prst="bentConnector3">
-            <a:avLst>
-              <a:gd name="adj1" fmla="val 50000"/>
-            </a:avLst>
-          </a:prstGeom>
-          <a:noFill/>
-          <a:ln w="19050"/>
-          <a:effectLst/>
-        </p:spPr>
-        <p:style>
-          <a:lnRef idx="1">
-            <a:schemeClr val="accent5"/>
-          </a:lnRef>
-          <a:fillRef idx="2">
-            <a:schemeClr val="accent5"/>
-          </a:fillRef>
-          <a:effectRef idx="1">
-            <a:schemeClr val="accent5"/>
-          </a:effectRef>
-          <a:fontRef idx="minor">
-            <a:schemeClr val="dk1"/>
-          </a:fontRef>
-        </p:style>
-      </p:cxnSp>
-      <p:cxnSp>
-        <p:nvCxnSpPr>
-          <p:cNvPr id="57" name="Elbow Connector 56"/>
-          <p:cNvCxnSpPr>
-            <a:stCxn id="54" idx="3"/>
-            <a:endCxn id="53" idx="3"/>
-          </p:cNvCxnSpPr>
-          <p:nvPr/>
-        </p:nvCxnSpPr>
-        <p:spPr>
-          <a:xfrm>
-            <a:off x="4354217" y="1659253"/>
-            <a:ext cx="370183" cy="363181"/>
-          </a:xfrm>
-          <a:prstGeom prst="bentConnector3">
-            <a:avLst>
-              <a:gd name="adj1" fmla="val 50000"/>
-            </a:avLst>
-          </a:prstGeom>
-          <a:noFill/>
-          <a:ln w="19050"/>
-          <a:effectLst/>
-        </p:spPr>
-        <p:style>
-          <a:lnRef idx="1">
-            <a:schemeClr val="accent5"/>
-          </a:lnRef>
-          <a:fillRef idx="2">
-            <a:schemeClr val="accent5"/>
-          </a:fillRef>
-          <a:effectRef idx="1">
-            <a:schemeClr val="accent5"/>
-          </a:effectRef>
-          <a:fontRef idx="minor">
-            <a:schemeClr val="dk1"/>
-          </a:fontRef>
-        </p:style>
-      </p:cxnSp>
-      <p:sp>
-        <p:nvSpPr>
-          <p:cNvPr id="59" name="Rectangle 58"/>
-          <p:cNvSpPr/>
-          <p:nvPr/>
-        </p:nvSpPr>
-        <p:spPr>
-          <a:xfrm flipH="1">
-            <a:off x="4724400" y="2244040"/>
-            <a:ext cx="1404109" cy="346760"/>
-          </a:xfrm>
-          <a:prstGeom prst="rect">
-            <a:avLst/>
-          </a:prstGeom>
-          <a:ln w="19050"/>
-          <a:effectLst/>
-        </p:spPr>
-        <p:style>
-          <a:lnRef idx="1">
-            <a:schemeClr val="accent5"/>
-          </a:lnRef>
-          <a:fillRef idx="2">
-            <a:schemeClr val="accent5"/>
-          </a:fillRef>
-          <a:effectRef idx="1">
-            <a:schemeClr val="accent5"/>
-          </a:effectRef>
-          <a:fontRef idx="minor">
-            <a:schemeClr val="dk1"/>
-          </a:fontRef>
-        </p:style>
-        <p:txBody>
-          <a:bodyPr rtlCol="0" anchor="ctr"/>
-          <a:lstStyle/>
-          <a:p>
-            <a:pPr algn="ctr"/>
-            <a:r>
-              <a:rPr lang="en-US" sz="1050" dirty="0" smtClean="0"/>
-              <a:t>…Command</a:t>
-            </a:r>
-            <a:endParaRPr lang="en-SG" sz="1050" dirty="0"/>
-          </a:p>
-        </p:txBody>
-      </p:sp>
-      <p:cxnSp>
-        <p:nvCxnSpPr>
-          <p:cNvPr id="60" name="Elbow Connector 59"/>
-          <p:cNvCxnSpPr>
-            <a:stCxn id="54" idx="3"/>
-            <a:endCxn id="59" idx="3"/>
-          </p:cNvCxnSpPr>
-          <p:nvPr/>
-        </p:nvCxnSpPr>
-        <p:spPr>
-          <a:xfrm>
-            <a:off x="4354217" y="1659253"/>
-            <a:ext cx="370183" cy="758167"/>
-          </a:xfrm>
-          <a:prstGeom prst="bentConnector3">
-            <a:avLst>
-              <a:gd name="adj1" fmla="val 50000"/>
-            </a:avLst>
-          </a:prstGeom>
-          <a:noFill/>
-          <a:ln w="19050"/>
-          <a:effectLst/>
-        </p:spPr>
-        <p:style>
-          <a:lnRef idx="1">
-            <a:schemeClr val="accent5"/>
-          </a:lnRef>
-          <a:fillRef idx="2">
-            <a:schemeClr val="accent5"/>
-          </a:fillRef>
-          <a:effectRef idx="1">
-            <a:schemeClr val="accent5"/>
-          </a:effectRef>
-          <a:fontRef idx="minor">
-            <a:schemeClr val="dk1"/>
-          </a:fontRef>
-        </p:style>
-      </p:cxnSp>
       <p:cxnSp>
         <p:nvCxnSpPr>
           <p:cNvPr id="67" name="Elbow Connector 66"/>
@@ -5353,7 +4966,7 @@
           <a:p>
             <a:pPr algn="ctr"/>
             <a:r>
-              <a:rPr lang="en-US" sz="1050" dirty="0" smtClean="0"/>
+              <a:rPr lang="en-US" sz="1050" dirty="0"/>
               <a:t>Messages</a:t>
             </a:r>
             <a:endParaRPr lang="en-SG" sz="1050" dirty="0"/>
@@ -5397,7 +5010,7 @@
           <a:p>
             <a:pPr algn="ctr"/>
             <a:r>
-              <a:rPr lang="en-US" sz="1050" dirty="0" err="1" smtClean="0"/>
+              <a:rPr lang="en-US" sz="1050" dirty="0" err="1"/>
               <a:t>Utils</a:t>
             </a:r>
             <a:endParaRPr lang="en-SG" sz="1050" dirty="0"/>
@@ -5485,7 +5098,7 @@
           <a:p>
             <a:pPr algn="ctr"/>
             <a:r>
-              <a:rPr lang="en-US" sz="1050" dirty="0" smtClean="0"/>
+              <a:rPr lang="en-US" sz="1050" dirty="0"/>
               <a:t>Adapted…</a:t>
             </a:r>
             <a:endParaRPr lang="en-SG" sz="1050" dirty="0"/>
@@ -5837,7 +5450,7 @@
           <a:p>
             <a:pPr algn="ctr"/>
             <a:r>
-              <a:rPr lang="en-US" sz="1050" dirty="0" smtClean="0"/>
+              <a:rPr lang="en-US" sz="1050" dirty="0"/>
               <a:t>Address</a:t>
             </a:r>
             <a:endParaRPr lang="en-SG" sz="1050" dirty="0"/>
@@ -5881,7 +5494,7 @@
           <a:p>
             <a:pPr algn="ctr"/>
             <a:r>
-              <a:rPr lang="en-US" sz="1050" dirty="0" smtClean="0"/>
+              <a:rPr lang="en-US" sz="1050" dirty="0"/>
               <a:t>Unit</a:t>
             </a:r>
             <a:endParaRPr lang="en-SG" sz="1050" dirty="0"/>
@@ -6008,7 +5621,7 @@
           <a:p>
             <a:pPr algn="ctr"/>
             <a:r>
-              <a:rPr lang="en-US" sz="1050" dirty="0" smtClean="0"/>
+              <a:rPr lang="en-US" sz="1050" dirty="0"/>
               <a:t>Postal code</a:t>
             </a:r>
             <a:endParaRPr lang="en-SG" sz="1050" dirty="0"/>
@@ -6052,7 +5665,7 @@
           <a:p>
             <a:pPr algn="ctr"/>
             <a:r>
-              <a:rPr lang="en-US" sz="1050" dirty="0" smtClean="0"/>
+              <a:rPr lang="en-US" sz="1050" dirty="0"/>
               <a:t>Street</a:t>
             </a:r>
             <a:endParaRPr lang="en-SG" sz="1050" dirty="0"/>
@@ -6096,7 +5709,7 @@
           <a:p>
             <a:pPr algn="ctr"/>
             <a:r>
-              <a:rPr lang="en-US" sz="1050" dirty="0" smtClean="0"/>
+              <a:rPr lang="en-US" sz="1050" dirty="0"/>
               <a:t>Block</a:t>
             </a:r>
             <a:endParaRPr lang="en-SG" sz="1050" dirty="0"/>
@@ -6260,10 +5873,9 @@
           <a:p>
             <a:pPr algn="ctr"/>
             <a:r>
-              <a:rPr lang="en-SG" sz="1050" dirty="0" smtClean="0"/>
+              <a:rPr lang="en-SG" sz="1050" dirty="0"/>
               <a:t>Contact</a:t>
             </a:r>
-            <a:endParaRPr lang="en-SG" sz="1050" dirty="0"/>
           </a:p>
         </p:txBody>
       </p:sp>
@@ -6304,7 +5916,7 @@
           <a:p>
             <a:pPr algn="ctr"/>
             <a:r>
-              <a:rPr lang="en-US" sz="1050" dirty="0" smtClean="0"/>
+              <a:rPr lang="en-US" sz="1050" dirty="0"/>
               <a:t>Phone</a:t>
             </a:r>
             <a:endParaRPr lang="en-SG" sz="1050" dirty="0"/>
@@ -6348,7 +5960,7 @@
           <a:p>
             <a:pPr algn="ctr"/>
             <a:r>
-              <a:rPr lang="en-US" sz="1050" dirty="0" smtClean="0"/>
+              <a:rPr lang="en-US" sz="1050" dirty="0"/>
               <a:t>Email</a:t>
             </a:r>
             <a:endParaRPr lang="en-SG" sz="1050" dirty="0"/>
@@ -6392,7 +6004,7 @@
           <a:p>
             <a:pPr algn="ctr"/>
             <a:r>
-              <a:rPr lang="en-US" sz="1050" dirty="0" smtClean="0"/>
+              <a:rPr lang="en-US" sz="1050" dirty="0"/>
               <a:t>Address</a:t>
             </a:r>
             <a:endParaRPr lang="en-SG" sz="1050" dirty="0"/>
@@ -6581,10 +6193,9 @@
           <a:p>
             <a:pPr algn="ctr"/>
             <a:r>
-              <a:rPr lang="en-SG" sz="1050" dirty="0" smtClean="0"/>
+              <a:rPr lang="en-SG" sz="1050" dirty="0"/>
               <a:t>&lt;&lt;interface&gt;&gt; Printable</a:t>
             </a:r>
-            <a:endParaRPr lang="en-SG" sz="1050" dirty="0"/>
           </a:p>
         </p:txBody>
       </p:sp>
@@ -6625,7 +6236,7 @@
           <a:p>
             <a:pPr algn="ctr"/>
             <a:r>
-              <a:rPr lang="en-US" sz="1050" dirty="0" smtClean="0"/>
+              <a:rPr lang="en-US" sz="1050" dirty="0"/>
               <a:t>Phone</a:t>
             </a:r>
             <a:endParaRPr lang="en-SG" sz="1050" dirty="0"/>
@@ -6669,7 +6280,7 @@
           <a:p>
             <a:pPr algn="ctr"/>
             <a:r>
-              <a:rPr lang="en-US" sz="1050" dirty="0" smtClean="0"/>
+              <a:rPr lang="en-US" sz="1050" dirty="0"/>
               <a:t>Email</a:t>
             </a:r>
             <a:endParaRPr lang="en-SG" sz="1050" dirty="0"/>
@@ -6713,7 +6324,7 @@
           <a:p>
             <a:pPr algn="ctr"/>
             <a:r>
-              <a:rPr lang="en-US" sz="1050" dirty="0" smtClean="0"/>
+              <a:rPr lang="en-US" sz="1050" dirty="0"/>
               <a:t>Address</a:t>
             </a:r>
             <a:endParaRPr lang="en-SG" sz="1050" dirty="0"/>
@@ -6914,7 +6525,7 @@
           <a:p>
             <a:pPr algn="ctr"/>
             <a:r>
-              <a:rPr lang="en-US" sz="1050" dirty="0" smtClean="0"/>
+              <a:rPr lang="en-US" sz="1050" dirty="0"/>
               <a:t>Name</a:t>
             </a:r>
             <a:endParaRPr lang="en-SG" sz="1050" dirty="0"/>
@@ -7037,15 +6648,15 @@
           <a:p>
             <a:pPr algn="ctr"/>
             <a:r>
-              <a:rPr lang="en-US" sz="1050" dirty="0" smtClean="0"/>
+              <a:rPr lang="en-US" sz="1050" dirty="0"/>
               <a:t>+ </a:t>
             </a:r>
             <a:r>
-              <a:rPr lang="en-US" sz="1050" dirty="0" err="1" smtClean="0"/>
+              <a:rPr lang="en-US" sz="1050" dirty="0" err="1"/>
               <a:t>getPrintableString</a:t>
             </a:r>
             <a:r>
-              <a:rPr lang="en-US" sz="1050" dirty="0" smtClean="0"/>
+              <a:rPr lang="en-US" sz="1050" dirty="0"/>
               <a:t>(): String</a:t>
             </a:r>
             <a:endParaRPr lang="en-SG" sz="1050" dirty="0"/>
@@ -7133,14 +6744,14 @@
           <a:p>
             <a:pPr algn="ctr"/>
             <a:r>
-              <a:rPr lang="en-US" sz="1050" dirty="0" smtClean="0"/>
+              <a:rPr lang="en-US" sz="1050" dirty="0"/>
               <a:t>Unique</a:t>
             </a:r>
             <a:br>
-              <a:rPr lang="en-US" sz="1050" dirty="0" smtClean="0"/>
+              <a:rPr lang="en-US" sz="1050" dirty="0"/>
             </a:br>
             <a:r>
-              <a:rPr lang="en-US" sz="1050" dirty="0" err="1" smtClean="0"/>
+              <a:rPr lang="en-US" sz="1050" dirty="0" err="1"/>
               <a:t>TagList</a:t>
             </a:r>
             <a:endParaRPr lang="en-SG" sz="1050" dirty="0"/>
@@ -7184,14 +6795,14 @@
           <a:p>
             <a:pPr algn="ctr"/>
             <a:r>
-              <a:rPr lang="en-US" sz="1050" dirty="0" smtClean="0"/>
+              <a:rPr lang="en-US" sz="1050" dirty="0"/>
               <a:t>Unique</a:t>
             </a:r>
             <a:br>
-              <a:rPr lang="en-US" sz="1050" dirty="0" smtClean="0"/>
+              <a:rPr lang="en-US" sz="1050" dirty="0"/>
             </a:br>
             <a:r>
-              <a:rPr lang="en-US" sz="1050" dirty="0" err="1" smtClean="0"/>
+              <a:rPr lang="en-US" sz="1050" dirty="0" err="1"/>
               <a:t>PersonList</a:t>
             </a:r>
             <a:endParaRPr lang="en-SG" sz="1050" dirty="0"/>
@@ -7235,7 +6846,7 @@
           <a:p>
             <a:pPr algn="ctr"/>
             <a:r>
-              <a:rPr lang="en-US" sz="1050" dirty="0" smtClean="0"/>
+              <a:rPr lang="en-US" sz="1050" dirty="0"/>
               <a:t>Person</a:t>
             </a:r>
             <a:endParaRPr lang="en-SG" sz="1050" dirty="0"/>
@@ -7602,7 +7213,7 @@
           <a:p>
             <a:pPr algn="ctr"/>
             <a:r>
-              <a:rPr lang="en-US" sz="1050" dirty="0" smtClean="0"/>
+              <a:rPr lang="en-US" sz="1050" dirty="0"/>
               <a:t>Tagging</a:t>
             </a:r>
             <a:endParaRPr lang="en-SG" sz="1050" dirty="0"/>
@@ -7746,7 +7357,7 @@
           <a:lstStyle/>
           <a:p>
             <a:r>
-              <a:rPr lang="en-US" dirty="0" smtClean="0">
+              <a:rPr lang="en-US" dirty="0">
                 <a:solidFill>
                   <a:schemeClr val="accent6">
                     <a:lumMod val="75000"/>
@@ -7755,13 +7366,6 @@
               </a:rPr>
               <a:t>*</a:t>
             </a:r>
-            <a:endParaRPr lang="en-US" dirty="0">
-              <a:solidFill>
-                <a:schemeClr val="accent6">
-                  <a:lumMod val="75000"/>
-                </a:schemeClr>
-              </a:solidFill>
-            </a:endParaRPr>
           </a:p>
         </p:txBody>
       </p:sp>
@@ -7788,7 +7392,7 @@
           <a:lstStyle/>
           <a:p>
             <a:r>
-              <a:rPr lang="en-US" sz="1100" dirty="0" err="1" smtClean="0">
+              <a:rPr lang="en-US" sz="1100" dirty="0" err="1">
                 <a:solidFill>
                   <a:schemeClr val="accent6">
                     <a:lumMod val="75000"/>
@@ -7918,14 +7522,14 @@
           <a:p>
             <a:pPr algn="ctr"/>
             <a:r>
-              <a:rPr lang="en-US" sz="1050" dirty="0" smtClean="0"/>
+              <a:rPr lang="en-US" sz="1050" dirty="0"/>
               <a:t>Unique</a:t>
             </a:r>
             <a:br>
-              <a:rPr lang="en-US" sz="1050" dirty="0" smtClean="0"/>
+              <a:rPr lang="en-US" sz="1050" dirty="0"/>
             </a:br>
             <a:r>
-              <a:rPr lang="en-US" sz="1050" dirty="0" err="1" smtClean="0"/>
+              <a:rPr lang="en-US" sz="1050" dirty="0" err="1"/>
               <a:t>TagList</a:t>
             </a:r>
             <a:endParaRPr lang="en-SG" sz="1050" dirty="0"/>
@@ -7969,14 +7573,14 @@
           <a:p>
             <a:pPr algn="ctr"/>
             <a:r>
-              <a:rPr lang="en-US" sz="1050" dirty="0" smtClean="0"/>
+              <a:rPr lang="en-US" sz="1050" dirty="0"/>
               <a:t>Unique</a:t>
             </a:r>
             <a:br>
-              <a:rPr lang="en-US" sz="1050" dirty="0" smtClean="0"/>
+              <a:rPr lang="en-US" sz="1050" dirty="0"/>
             </a:br>
             <a:r>
-              <a:rPr lang="en-US" sz="1050" dirty="0" err="1" smtClean="0"/>
+              <a:rPr lang="en-US" sz="1050" dirty="0" err="1"/>
               <a:t>PersonList</a:t>
             </a:r>
             <a:endParaRPr lang="en-SG" sz="1050" dirty="0"/>
@@ -8020,7 +7624,7 @@
           <a:p>
             <a:pPr algn="ctr"/>
             <a:r>
-              <a:rPr lang="en-US" sz="1050" dirty="0" smtClean="0"/>
+              <a:rPr lang="en-US" sz="1050" dirty="0"/>
               <a:t>Person</a:t>
             </a:r>
             <a:endParaRPr lang="en-SG" sz="1050" dirty="0"/>
@@ -8387,7 +7991,7 @@
           <a:p>
             <a:pPr algn="ctr"/>
             <a:r>
-              <a:rPr lang="en-US" sz="1050" dirty="0" smtClean="0"/>
+              <a:rPr lang="en-US" sz="1050" dirty="0"/>
               <a:t>Tagging</a:t>
             </a:r>
             <a:endParaRPr lang="en-SG" sz="1050" dirty="0"/>
@@ -8493,7 +8097,7 @@
           <a:lstStyle/>
           <a:p>
             <a:r>
-              <a:rPr lang="en-US" dirty="0" smtClean="0">
+              <a:rPr lang="en-US" dirty="0">
                 <a:solidFill>
                   <a:schemeClr val="accent6">
                     <a:lumMod val="75000"/>
@@ -8502,13 +8106,6 @@
               </a:rPr>
               <a:t>*</a:t>
             </a:r>
-            <a:endParaRPr lang="en-US" dirty="0">
-              <a:solidFill>
-                <a:schemeClr val="accent6">
-                  <a:lumMod val="75000"/>
-                </a:schemeClr>
-              </a:solidFill>
-            </a:endParaRPr>
           </a:p>
         </p:txBody>
       </p:sp>
@@ -8617,7 +8214,7 @@
           <a:lstStyle/>
           <a:p>
             <a:r>
-              <a:rPr lang="en-US" sz="1100" dirty="0" err="1" smtClean="0">
+              <a:rPr lang="en-US" sz="1100" dirty="0" err="1">
                 <a:solidFill>
                   <a:schemeClr val="accent6">
                     <a:lumMod val="75000"/>

</xml_diff>